<commit_message>
Uploading files for Segment 4
</commit_message>
<xml_diff>
--- a/Segment2/Dahsboard_Slides.pptx
+++ b/Segment2/Dahsboard_Slides.pptx
@@ -14,6 +14,7 @@
     <p:sldId id="369" r:id="rId11"/>
     <p:sldId id="363" r:id="rId12"/>
     <p:sldId id="346" r:id="rId13"/>
+    <p:sldId id="370" r:id="rId14"/>
   </p:sldIdLst>
   <p:sldSz cx="12192000" cy="6858000"/>
   <p:notesSz cx="6858000" cy="9144000"/>
@@ -842,7 +843,7 @@
           <a:p>
             <a:fld id="{9184DA70-C731-4C70-880D-CCD4705E623C}" type="datetime1">
               <a:rPr lang="en-US" smtClean="0"/>
-              <a:t>1/12/2021</a:t>
+              <a:t>1/13/2021</a:t>
             </a:fld>
             <a:endParaRPr lang="en-US" dirty="0"/>
           </a:p>
@@ -1093,7 +1094,7 @@
           <a:p>
             <a:fld id="{62D6E202-B606-4609-B914-27C9371A1F6D}" type="datetime1">
               <a:rPr lang="en-US" smtClean="0"/>
-              <a:t>1/12/2021</a:t>
+              <a:t>1/13/2021</a:t>
             </a:fld>
             <a:endParaRPr lang="en-US" dirty="0"/>
           </a:p>
@@ -1408,7 +1409,7 @@
           <a:p>
             <a:fld id="{62D6E202-B606-4609-B914-27C9371A1F6D}" type="datetime1">
               <a:rPr lang="en-US" smtClean="0"/>
-              <a:t>1/12/2021</a:t>
+              <a:t>1/13/2021</a:t>
             </a:fld>
             <a:endParaRPr lang="en-US" dirty="0"/>
           </a:p>
@@ -1750,7 +1751,7 @@
           <a:p>
             <a:fld id="{62D6E202-B606-4609-B914-27C9371A1F6D}" type="datetime1">
               <a:rPr lang="en-US" smtClean="0"/>
-              <a:t>1/12/2021</a:t>
+              <a:t>1/13/2021</a:t>
             </a:fld>
             <a:endParaRPr lang="en-US" dirty="0"/>
           </a:p>
@@ -2065,7 +2066,7 @@
           <a:p>
             <a:fld id="{62D6E202-B606-4609-B914-27C9371A1F6D}" type="datetime1">
               <a:rPr lang="en-US" smtClean="0"/>
-              <a:t>1/12/2021</a:t>
+              <a:t>1/13/2021</a:t>
             </a:fld>
             <a:endParaRPr lang="en-US" dirty="0"/>
           </a:p>
@@ -2459,7 +2460,7 @@
           <a:p>
             <a:fld id="{62D6E202-B606-4609-B914-27C9371A1F6D}" type="datetime1">
               <a:rPr lang="en-US" smtClean="0"/>
-              <a:t>1/12/2021</a:t>
+              <a:t>1/13/2021</a:t>
             </a:fld>
             <a:endParaRPr lang="en-US" dirty="0"/>
           </a:p>
@@ -2630,7 +2631,7 @@
           <a:p>
             <a:fld id="{62D6E202-B606-4609-B914-27C9371A1F6D}" type="datetime1">
               <a:rPr lang="en-US" smtClean="0"/>
-              <a:t>1/12/2021</a:t>
+              <a:t>1/13/2021</a:t>
             </a:fld>
             <a:endParaRPr lang="en-US" dirty="0"/>
           </a:p>
@@ -2811,7 +2812,7 @@
           <a:p>
             <a:fld id="{62D6E202-B606-4609-B914-27C9371A1F6D}" type="datetime1">
               <a:rPr lang="en-US" smtClean="0"/>
-              <a:t>1/12/2021</a:t>
+              <a:t>1/13/2021</a:t>
             </a:fld>
             <a:endParaRPr lang="en-US" dirty="0"/>
           </a:p>
@@ -2988,7 +2989,7 @@
           <a:p>
             <a:fld id="{62D6E202-B606-4609-B914-27C9371A1F6D}" type="datetime1">
               <a:rPr lang="en-US" smtClean="0"/>
-              <a:t>1/12/2021</a:t>
+              <a:t>1/13/2021</a:t>
             </a:fld>
             <a:endParaRPr lang="en-US" dirty="0"/>
           </a:p>
@@ -3236,7 +3237,7 @@
           <a:p>
             <a:fld id="{97669AF7-7BEB-44E4-9852-375E34362B5B}" type="datetime1">
               <a:rPr lang="en-US" smtClean="0"/>
-              <a:t>1/12/2021</a:t>
+              <a:t>1/13/2021</a:t>
             </a:fld>
             <a:endParaRPr lang="en-US" dirty="0"/>
           </a:p>
@@ -3468,7 +3469,7 @@
           <a:p>
             <a:fld id="{62D6E202-B606-4609-B914-27C9371A1F6D}" type="datetime1">
               <a:rPr lang="en-US" smtClean="0"/>
-              <a:t>1/12/2021</a:t>
+              <a:t>1/13/2021</a:t>
             </a:fld>
             <a:endParaRPr lang="en-US" dirty="0"/>
           </a:p>
@@ -3843,7 +3844,7 @@
           <a:p>
             <a:fld id="{62D6E202-B606-4609-B914-27C9371A1F6D}" type="datetime1">
               <a:rPr lang="en-US" smtClean="0"/>
-              <a:t>1/12/2021</a:t>
+              <a:t>1/13/2021</a:t>
             </a:fld>
             <a:endParaRPr lang="en-US" dirty="0"/>
           </a:p>
@@ -3967,7 +3968,7 @@
           <a:p>
             <a:fld id="{1775B394-D9F9-4F0C-B15D-605F45CB9E9F}" type="datetime1">
               <a:rPr lang="en-US" smtClean="0"/>
-              <a:t>1/12/2021</a:t>
+              <a:t>1/13/2021</a:t>
             </a:fld>
             <a:endParaRPr lang="en-US" dirty="0"/>
           </a:p>
@@ -4062,7 +4063,7 @@
           <a:p>
             <a:fld id="{39667345-2558-425A-8533-9BFDBCE15005}" type="datetime1">
               <a:rPr lang="en-US" smtClean="0"/>
-              <a:t>1/12/2021</a:t>
+              <a:t>1/13/2021</a:t>
             </a:fld>
             <a:endParaRPr lang="en-US" dirty="0"/>
           </a:p>
@@ -4317,7 +4318,7 @@
           <a:p>
             <a:fld id="{62D6E202-B606-4609-B914-27C9371A1F6D}" type="datetime1">
               <a:rPr lang="en-US" smtClean="0"/>
-              <a:t>1/12/2021</a:t>
+              <a:t>1/13/2021</a:t>
             </a:fld>
             <a:endParaRPr lang="en-US" dirty="0"/>
           </a:p>
@@ -4581,7 +4582,7 @@
           <a:p>
             <a:fld id="{62D6E202-B606-4609-B914-27C9371A1F6D}" type="datetime1">
               <a:rPr lang="en-US" smtClean="0"/>
-              <a:t>1/12/2021</a:t>
+              <a:t>1/13/2021</a:t>
             </a:fld>
             <a:endParaRPr lang="en-US" dirty="0"/>
           </a:p>
@@ -5325,7 +5326,7 @@
           <a:p>
             <a:fld id="{62D6E202-B606-4609-B914-27C9371A1F6D}" type="datetime1">
               <a:rPr lang="en-US" smtClean="0"/>
-              <a:t>1/12/2021</a:t>
+              <a:t>1/13/2021</a:t>
             </a:fld>
             <a:endParaRPr lang="en-US" dirty="0"/>
           </a:p>
@@ -9772,6 +9773,150 @@
     <p:extLst>
       <p:ext uri="{BB962C8B-B14F-4D97-AF65-F5344CB8AC3E}">
         <p14:creationId xmlns:p14="http://schemas.microsoft.com/office/powerpoint/2010/main" val="2156097762"/>
+      </p:ext>
+    </p:extLst>
+  </p:cSld>
+  <p:clrMapOvr>
+    <a:masterClrMapping/>
+  </p:clrMapOvr>
+</p:sld>
+</file>
+
+<file path=ppt/slides/slide10.xml><?xml version="1.0" encoding="utf-8"?>
+<p:sld xmlns:a="http://schemas.openxmlformats.org/drawingml/2006/main" xmlns:r="http://schemas.openxmlformats.org/officeDocument/2006/relationships" xmlns:p="http://schemas.openxmlformats.org/presentationml/2006/main">
+  <p:cSld>
+    <p:spTree>
+      <p:nvGrpSpPr>
+        <p:cNvPr id="1" name=""/>
+        <p:cNvGrpSpPr/>
+        <p:nvPr/>
+      </p:nvGrpSpPr>
+      <p:grpSpPr>
+        <a:xfrm>
+          <a:off x="0" y="0"/>
+          <a:ext cx="0" cy="0"/>
+          <a:chOff x="0" y="0"/>
+          <a:chExt cx="0" cy="0"/>
+        </a:xfrm>
+      </p:grpSpPr>
+      <p:sp>
+        <p:nvSpPr>
+          <p:cNvPr id="4" name="Rectangle 3">
+            <a:extLst>
+              <a:ext uri="{FF2B5EF4-FFF2-40B4-BE49-F238E27FC236}">
+                <a16:creationId xmlns:a16="http://schemas.microsoft.com/office/drawing/2014/main" id="{1D68A7C6-8171-4CBA-A098-F4E471BA86BA}"/>
+              </a:ext>
+            </a:extLst>
+          </p:cNvPr>
+          <p:cNvSpPr/>
+          <p:nvPr/>
+        </p:nvSpPr>
+        <p:spPr>
+          <a:xfrm>
+            <a:off x="1246232" y="1834490"/>
+            <a:ext cx="7778498" cy="1323439"/>
+          </a:xfrm>
+          <a:prstGeom prst="rect">
+            <a:avLst/>
+          </a:prstGeom>
+          <a:noFill/>
+        </p:spPr>
+        <p:txBody>
+          <a:bodyPr wrap="square" lIns="91440" tIns="45720" rIns="91440" bIns="45720">
+            <a:spAutoFit/>
+            <a:scene3d>
+              <a:camera prst="orthographicFront"/>
+              <a:lightRig rig="harsh" dir="t"/>
+            </a:scene3d>
+            <a:sp3d extrusionH="57150" prstMaterial="matte">
+              <a:bevelT w="63500" h="12700" prst="angle"/>
+              <a:contourClr>
+                <a:schemeClr val="bg1">
+                  <a:lumMod val="65000"/>
+                </a:schemeClr>
+              </a:contourClr>
+            </a:sp3d>
+          </a:bodyPr>
+          <a:lstStyle/>
+          <a:p>
+            <a:pPr algn="ctr"/>
+            <a:r>
+              <a:rPr lang="en-US" sz="8000" b="1" cap="none" spc="0" dirty="0">
+                <a:ln/>
+                <a:solidFill>
+                  <a:schemeClr val="tx1">
+                    <a:lumMod val="50000"/>
+                    <a:lumOff val="50000"/>
+                  </a:schemeClr>
+                </a:solidFill>
+                <a:effectLst/>
+              </a:rPr>
+              <a:t>THANK YOU</a:t>
+            </a:r>
+          </a:p>
+        </p:txBody>
+      </p:sp>
+      <p:sp>
+        <p:nvSpPr>
+          <p:cNvPr id="5" name="Rectangle 4">
+            <a:extLst>
+              <a:ext uri="{FF2B5EF4-FFF2-40B4-BE49-F238E27FC236}">
+                <a16:creationId xmlns:a16="http://schemas.microsoft.com/office/drawing/2014/main" id="{E015AAE2-E0E3-418E-A5BC-7F026AEE7FC9}"/>
+              </a:ext>
+            </a:extLst>
+          </p:cNvPr>
+          <p:cNvSpPr/>
+          <p:nvPr/>
+        </p:nvSpPr>
+        <p:spPr>
+          <a:xfrm>
+            <a:off x="2419050" y="3700072"/>
+            <a:ext cx="5830429" cy="1015663"/>
+          </a:xfrm>
+          <a:prstGeom prst="rect">
+            <a:avLst/>
+          </a:prstGeom>
+          <a:noFill/>
+        </p:spPr>
+        <p:txBody>
+          <a:bodyPr wrap="square" lIns="91440" tIns="45720" rIns="91440" bIns="45720">
+            <a:spAutoFit/>
+            <a:scene3d>
+              <a:camera prst="orthographicFront"/>
+              <a:lightRig rig="harsh" dir="t"/>
+            </a:scene3d>
+            <a:sp3d extrusionH="57150" prstMaterial="matte">
+              <a:bevelT w="63500" h="12700" prst="angle"/>
+              <a:contourClr>
+                <a:schemeClr val="bg1">
+                  <a:lumMod val="65000"/>
+                </a:schemeClr>
+              </a:contourClr>
+            </a:sp3d>
+          </a:bodyPr>
+          <a:lstStyle/>
+          <a:p>
+            <a:pPr algn="ctr"/>
+            <a:r>
+              <a:rPr lang="en-US" sz="6000" b="1" cap="none" spc="0" dirty="0">
+                <a:ln/>
+                <a:solidFill>
+                  <a:schemeClr val="tx1">
+                    <a:lumMod val="65000"/>
+                    <a:lumOff val="35000"/>
+                  </a:schemeClr>
+                </a:solidFill>
+                <a:effectLst/>
+              </a:rPr>
+              <a:t>Questions ???</a:t>
+            </a:r>
+          </a:p>
+        </p:txBody>
+      </p:sp>
+    </p:spTree>
+    <p:extLst>
+      <p:ext uri="{BB962C8B-B14F-4D97-AF65-F5344CB8AC3E}">
+        <p14:creationId xmlns:p14="http://schemas.microsoft.com/office/powerpoint/2010/main" val="4065435841"/>
       </p:ext>
     </p:extLst>
   </p:cSld>
@@ -17165,24 +17310,6 @@
 </file>
 
 <file path=customXml/item1.xml><?xml version="1.0" encoding="utf-8"?>
-<p:properties xmlns:p="http://schemas.microsoft.com/office/2006/metadata/properties" xmlns:xsi="http://www.w3.org/2001/XMLSchema-instance" xmlns:pc="http://schemas.microsoft.com/office/infopath/2007/PartnerControls">
-  <documentManagement>
-    <Status xmlns="71af3243-3dd4-4a8d-8c0d-dd76da1f02a5">Not started</Status>
-    <MediaServiceKeyPoints xmlns="71af3243-3dd4-4a8d-8c0d-dd76da1f02a5" xsi:nil="true"/>
-  </documentManagement>
-</p:properties>
-</file>
-
-<file path=customXml/item2.xml><?xml version="1.0" encoding="utf-8"?>
-<?mso-contentType ?>
-<FormTemplates xmlns="http://schemas.microsoft.com/sharepoint/v3/contenttype/forms">
-  <Display>DocumentLibraryForm</Display>
-  <Edit>DocumentLibraryForm</Edit>
-  <New>DocumentLibraryForm</New>
-</FormTemplates>
-</file>
-
-<file path=customXml/item3.xml><?xml version="1.0" encoding="utf-8"?>
 <ct:contentTypeSchema xmlns:ct="http://schemas.microsoft.com/office/2006/metadata/contentType" xmlns:ma="http://schemas.microsoft.com/office/2006/metadata/properties/metaAttributes" ct:_="" ma:_="" ma:contentTypeName="Document" ma:contentTypeID="0x01010079F111ED35F8CC479449609E8A0923A6" ma:contentTypeVersion="12" ma:contentTypeDescription="Create a new document." ma:contentTypeScope="" ma:versionID="a410dd7f93c95333ffa1b60ed6adedd1">
   <xsd:schema xmlns:xsd="http://www.w3.org/2001/XMLSchema" xmlns:xs="http://www.w3.org/2001/XMLSchema" xmlns:p="http://schemas.microsoft.com/office/2006/metadata/properties" xmlns:ns2="71af3243-3dd4-4a8d-8c0d-dd76da1f02a5" xmlns:ns3="16c05727-aa75-4e4a-9b5f-8a80a1165891" targetNamespace="http://schemas.microsoft.com/office/2006/metadata/properties" ma:root="true" ma:fieldsID="a936d9baba76aa3866493feff160faab" ns2:_="" ns3:_="">
     <xsd:import namespace="71af3243-3dd4-4a8d-8c0d-dd76da1f02a5"/>
@@ -17403,25 +17530,25 @@
 </ct:contentTypeSchema>
 </file>
 
-<file path=customXml/itemProps1.xml><?xml version="1.0" encoding="utf-8"?>
-<ds:datastoreItem xmlns:ds="http://schemas.openxmlformats.org/officeDocument/2006/customXml" ds:itemID="{A03EEFF0-FB57-4CB4-8BFC-DF397689E2ED}">
-  <ds:schemaRefs>
-    <ds:schemaRef ds:uri="http://schemas.microsoft.com/office/2006/metadata/properties"/>
-    <ds:schemaRef ds:uri="http://schemas.microsoft.com/office/infopath/2007/PartnerControls"/>
-    <ds:schemaRef ds:uri="71af3243-3dd4-4a8d-8c0d-dd76da1f02a5"/>
-  </ds:schemaRefs>
-</ds:datastoreItem>
+<file path=customXml/item2.xml><?xml version="1.0" encoding="utf-8"?>
+<?mso-contentType ?>
+<FormTemplates xmlns="http://schemas.microsoft.com/sharepoint/v3/contenttype/forms">
+  <Display>DocumentLibraryForm</Display>
+  <Edit>DocumentLibraryForm</Edit>
+  <New>DocumentLibraryForm</New>
+</FormTemplates>
 </file>
 
-<file path=customXml/itemProps2.xml><?xml version="1.0" encoding="utf-8"?>
-<ds:datastoreItem xmlns:ds="http://schemas.openxmlformats.org/officeDocument/2006/customXml" ds:itemID="{AA3F7EDC-E5B4-4BBC-9D2A-CBE6D46C37AD}">
-  <ds:schemaRefs>
-    <ds:schemaRef ds:uri="http://schemas.microsoft.com/sharepoint/v3/contenttype/forms"/>
-  </ds:schemaRefs>
-</ds:datastoreItem>
+<file path=customXml/item3.xml><?xml version="1.0" encoding="utf-8"?>
+<p:properties xmlns:p="http://schemas.microsoft.com/office/2006/metadata/properties" xmlns:xsi="http://www.w3.org/2001/XMLSchema-instance" xmlns:pc="http://schemas.microsoft.com/office/infopath/2007/PartnerControls">
+  <documentManagement>
+    <Status xmlns="71af3243-3dd4-4a8d-8c0d-dd76da1f02a5">Not started</Status>
+    <MediaServiceKeyPoints xmlns="71af3243-3dd4-4a8d-8c0d-dd76da1f02a5" xsi:nil="true"/>
+  </documentManagement>
+</p:properties>
 </file>
 
-<file path=customXml/itemProps3.xml><?xml version="1.0" encoding="utf-8"?>
+<file path=customXml/itemProps1.xml><?xml version="1.0" encoding="utf-8"?>
 <ds:datastoreItem xmlns:ds="http://schemas.openxmlformats.org/officeDocument/2006/customXml" ds:itemID="{93932EF5-314F-409E-8020-FEE5FA0795B9}">
   <ds:schemaRefs>
     <ds:schemaRef ds:uri="http://schemas.microsoft.com/office/2006/metadata/contentType"/>
@@ -17438,4 +17565,22 @@
     <ds:schemaRef ds:uri="http://schemas.microsoft.com/internal/obd"/>
   </ds:schemaRefs>
 </ds:datastoreItem>
+</file>
+
+<file path=customXml/itemProps2.xml><?xml version="1.0" encoding="utf-8"?>
+<ds:datastoreItem xmlns:ds="http://schemas.openxmlformats.org/officeDocument/2006/customXml" ds:itemID="{AA3F7EDC-E5B4-4BBC-9D2A-CBE6D46C37AD}">
+  <ds:schemaRefs>
+    <ds:schemaRef ds:uri="http://schemas.microsoft.com/sharepoint/v3/contenttype/forms"/>
+  </ds:schemaRefs>
+</ds:datastoreItem>
+</file>
+
+<file path=customXml/itemProps3.xml><?xml version="1.0" encoding="utf-8"?>
+<ds:datastoreItem xmlns:ds="http://schemas.openxmlformats.org/officeDocument/2006/customXml" ds:itemID="{A03EEFF0-FB57-4CB4-8BFC-DF397689E2ED}">
+  <ds:schemaRefs>
+    <ds:schemaRef ds:uri="http://schemas.microsoft.com/office/2006/metadata/properties"/>
+    <ds:schemaRef ds:uri="http://schemas.microsoft.com/office/infopath/2007/PartnerControls"/>
+    <ds:schemaRef ds:uri="71af3243-3dd4-4a8d-8c0d-dd76da1f02a5"/>
+  </ds:schemaRefs>
+</ds:datastoreItem>
 </file>
</xml_diff>